<commit_message>
added table of buildings
</commit_message>
<xml_diff>
--- a/presentation_files/slideshare.pptx
+++ b/presentation_files/slideshare.pptx
@@ -11,6 +11,7 @@
     <p:sldId id="260" r:id="rId5"/>
     <p:sldId id="261" r:id="rId6"/>
     <p:sldId id="262" r:id="rId7"/>
+    <p:sldId id="263" r:id="rId8"/>
   </p:sldIdLst>
   <p:sldSz cx="9144000" cy="6858000" type="screen4x3"/>
   <p:notesSz cx="6858000" cy="9144000"/>
@@ -4700,6 +4701,194 @@
               </a:rPr>
               <a:t>Measure real reduction in electricity use</a:t>
             </a:r>
+          </a:p>
+        </p:txBody>
+      </p:sp>
+    </p:spTree>
+  </p:cSld>
+  <p:clrMapOvr>
+    <a:masterClrMapping/>
+  </p:clrMapOvr>
+</p:sld>
+</file>
+
+<file path=ppt/slides/slide7.xml><?xml version="1.0" encoding="utf-8"?>
+<p:sld xmlns:a="http://schemas.openxmlformats.org/drawingml/2006/main" xmlns:r="http://schemas.openxmlformats.org/officeDocument/2006/relationships" xmlns:mc="http://schemas.openxmlformats.org/markup-compatibility/2006" xmlns:mv="urn:schemas-microsoft-com:mac:vml" xmlns:p="http://schemas.openxmlformats.org/presentationml/2006/main" mc:Ignorable="mv" mc:PreserveAttributes="mv:*">
+  <p:cSld>
+    <p:spTree>
+      <p:nvGrpSpPr>
+        <p:cNvPr id="1" name=""/>
+        <p:cNvGrpSpPr/>
+        <p:nvPr/>
+      </p:nvGrpSpPr>
+      <p:grpSpPr>
+        <a:xfrm>
+          <a:off x="0" y="0"/>
+          <a:ext cx="0" cy="0"/>
+          <a:chOff x="0" y="0"/>
+          <a:chExt cx="0" cy="0"/>
+        </a:xfrm>
+      </p:grpSpPr>
+      <p:sp>
+        <p:nvSpPr>
+          <p:cNvPr id="21" name="TextBox 20"/>
+          <p:cNvSpPr txBox="1"/>
+          <p:nvPr/>
+        </p:nvSpPr>
+        <p:spPr>
+          <a:xfrm>
+            <a:off x="0" y="216660"/>
+            <a:ext cx="9144000" cy="2862322"/>
+          </a:xfrm>
+          <a:prstGeom prst="rect">
+            <a:avLst/>
+          </a:prstGeom>
+          <a:noFill/>
+        </p:spPr>
+        <p:txBody>
+          <a:bodyPr wrap="square" rtlCol="0">
+            <a:spAutoFit/>
+          </a:bodyPr>
+          <a:lstStyle/>
+          <a:p>
+            <a:pPr algn="ctr"/>
+            <a:r>
+              <a:rPr lang="en-US" sz="3600" dirty="0" smtClean="0">
+                <a:latin typeface="Avenir Black"/>
+                <a:cs typeface="Avenir Black"/>
+              </a:rPr>
+              <a:t>Try it out!  </a:t>
+            </a:r>
+          </a:p>
+          <a:p>
+            <a:pPr algn="ctr"/>
+            <a:r>
+              <a:rPr lang="en-US" sz="3600" dirty="0" smtClean="0">
+                <a:latin typeface="Avenir Black"/>
+                <a:cs typeface="Avenir Black"/>
+              </a:rPr>
+              <a:t>Register by texting your bldg #</a:t>
+            </a:r>
+          </a:p>
+          <a:p>
+            <a:pPr algn="ctr"/>
+            <a:r>
+              <a:rPr lang="en-US" sz="3600" dirty="0">
+                <a:latin typeface="Avenir Black"/>
+                <a:cs typeface="Avenir Black"/>
+              </a:rPr>
+              <a:t>t</a:t>
+            </a:r>
+            <a:r>
+              <a:rPr lang="en-US" sz="3600" dirty="0" smtClean="0">
+                <a:latin typeface="Avenir Black"/>
+                <a:cs typeface="Avenir Black"/>
+              </a:rPr>
+              <a:t>o</a:t>
+            </a:r>
+          </a:p>
+          <a:p>
+            <a:pPr algn="ctr"/>
+            <a:endParaRPr lang="en-US" sz="3600" dirty="0" smtClean="0">
+              <a:latin typeface="Avenir Black"/>
+              <a:cs typeface="Avenir Black"/>
+            </a:endParaRPr>
+          </a:p>
+          <a:p>
+            <a:pPr algn="ctr"/>
+            <a:r>
+              <a:rPr lang="en-US" sz="3600" dirty="0" smtClean="0">
+                <a:latin typeface="Avenir Black"/>
+                <a:cs typeface="Avenir Black"/>
+              </a:rPr>
+              <a:t>(760) 452-8548</a:t>
+            </a:r>
+            <a:endParaRPr lang="en-US" sz="3600" dirty="0">
+              <a:latin typeface="Avenir Black"/>
+              <a:cs typeface="Avenir Black"/>
+            </a:endParaRPr>
+          </a:p>
+        </p:txBody>
+      </p:sp>
+      <p:sp>
+        <p:nvSpPr>
+          <p:cNvPr id="22" name="Down Arrow 21"/>
+          <p:cNvSpPr/>
+          <p:nvPr/>
+        </p:nvSpPr>
+        <p:spPr>
+          <a:xfrm>
+            <a:off x="4127229" y="3330880"/>
+            <a:ext cx="1018329" cy="1749321"/>
+          </a:xfrm>
+          <a:prstGeom prst="downArrow">
+            <a:avLst/>
+          </a:prstGeom>
+          <a:solidFill>
+            <a:schemeClr val="bg1">
+              <a:lumMod val="50000"/>
+            </a:schemeClr>
+          </a:solidFill>
+          <a:ln>
+            <a:noFill/>
+          </a:ln>
+        </p:spPr>
+        <p:style>
+          <a:lnRef idx="1">
+            <a:schemeClr val="accent1"/>
+          </a:lnRef>
+          <a:fillRef idx="3">
+            <a:schemeClr val="accent1"/>
+          </a:fillRef>
+          <a:effectRef idx="2">
+            <a:schemeClr val="accent1"/>
+          </a:effectRef>
+          <a:fontRef idx="minor">
+            <a:schemeClr val="lt1"/>
+          </a:fontRef>
+        </p:style>
+        <p:txBody>
+          <a:bodyPr rtlCol="0" anchor="ctr"/>
+          <a:lstStyle/>
+          <a:p>
+            <a:pPr algn="ctr"/>
+            <a:endParaRPr lang="en-US"/>
+          </a:p>
+        </p:txBody>
+      </p:sp>
+      <p:sp>
+        <p:nvSpPr>
+          <p:cNvPr id="24" name="Rectangle 23"/>
+          <p:cNvSpPr/>
+          <p:nvPr/>
+        </p:nvSpPr>
+        <p:spPr>
+          <a:xfrm>
+            <a:off x="3062845" y="5080201"/>
+            <a:ext cx="3018317" cy="369332"/>
+          </a:xfrm>
+          <a:prstGeom prst="rect">
+            <a:avLst/>
+          </a:prstGeom>
+        </p:spPr>
+        <p:txBody>
+          <a:bodyPr wrap="none">
+            <a:spAutoFit/>
+          </a:bodyPr>
+          <a:lstStyle/>
+          <a:p>
+            <a:pPr algn="ctr"/>
+            <a:r>
+              <a:rPr lang="en-US" dirty="0" smtClean="0">
+                <a:latin typeface="Avenir Black"/>
+                <a:cs typeface="Avenir Black"/>
+              </a:rPr>
+              <a:t>(see bldg numbers below)</a:t>
+            </a:r>
+            <a:endParaRPr lang="en-US" dirty="0">
+              <a:latin typeface="Avenir Black"/>
+              <a:cs typeface="Avenir Black"/>
+            </a:endParaRPr>
           </a:p>
         </p:txBody>
       </p:sp>

</xml_diff>